<commit_message>
Catchup on low battery day.
</commit_message>
<xml_diff>
--- a/Presentations/01 Conditionals - Variables - 29 Jan.pptx
+++ b/Presentations/01 Conditionals - Variables - 29 Jan.pptx
@@ -161,10 +161,6 @@
     </p:ext>
   </p:extLst>
 </p:presentation>
-</file>
-
-<file path=ppt/revisionInfo.xml><?xml version="1.0" encoding="utf-8"?>
-<p1510:revInfo xmlns:a="http://schemas.openxmlformats.org/drawingml/2006/main" xmlns:r="http://schemas.openxmlformats.org/officeDocument/2006/relationships" xmlns:p1510="http://schemas.microsoft.com/office/powerpoint/2015/10/main"/>
 </file>
 
 <file path=ppt/charts/chart1.xml><?xml version="1.0" encoding="utf-8"?>
@@ -1957,7 +1953,7 @@
           <a:p>
             <a:fld id="{F45F967A-6F1A-4F66-88BD-402BDCCDE14E}" type="datetimeFigureOut">
               <a:rPr lang="en-US" smtClean="0"/>
-              <a:t>1/29/2018</a:t>
+              <a:t>9/17/2018</a:t>
             </a:fld>
             <a:endParaRPr lang="en-US"/>
           </a:p>
@@ -2497,7 +2493,7 @@
           <a:p>
             <a:fld id="{6471BAD1-2447-4D0B-B8FB-103A4F807A4C}" type="datetimeFigureOut">
               <a:rPr lang="en-US" smtClean="0"/>
-              <a:t>1/29/2018</a:t>
+              <a:t>9/17/2018</a:t>
             </a:fld>
             <a:endParaRPr lang="en-US"/>
           </a:p>
@@ -2667,7 +2663,7 @@
           <a:p>
             <a:fld id="{6471BAD1-2447-4D0B-B8FB-103A4F807A4C}" type="datetimeFigureOut">
               <a:rPr lang="en-US" smtClean="0"/>
-              <a:t>1/29/2018</a:t>
+              <a:t>9/17/2018</a:t>
             </a:fld>
             <a:endParaRPr lang="en-US"/>
           </a:p>
@@ -2847,7 +2843,7 @@
           <a:p>
             <a:fld id="{6471BAD1-2447-4D0B-B8FB-103A4F807A4C}" type="datetimeFigureOut">
               <a:rPr lang="en-US" smtClean="0"/>
-              <a:t>1/29/2018</a:t>
+              <a:t>9/17/2018</a:t>
             </a:fld>
             <a:endParaRPr lang="en-US"/>
           </a:p>
@@ -3017,7 +3013,7 @@
           <a:p>
             <a:fld id="{6471BAD1-2447-4D0B-B8FB-103A4F807A4C}" type="datetimeFigureOut">
               <a:rPr lang="en-US" smtClean="0"/>
-              <a:t>1/29/2018</a:t>
+              <a:t>9/17/2018</a:t>
             </a:fld>
             <a:endParaRPr lang="en-US"/>
           </a:p>
@@ -3263,7 +3259,7 @@
           <a:p>
             <a:fld id="{6471BAD1-2447-4D0B-B8FB-103A4F807A4C}" type="datetimeFigureOut">
               <a:rPr lang="en-US" smtClean="0"/>
-              <a:t>1/29/2018</a:t>
+              <a:t>9/17/2018</a:t>
             </a:fld>
             <a:endParaRPr lang="en-US"/>
           </a:p>
@@ -3495,7 +3491,7 @@
           <a:p>
             <a:fld id="{6471BAD1-2447-4D0B-B8FB-103A4F807A4C}" type="datetimeFigureOut">
               <a:rPr lang="en-US" smtClean="0"/>
-              <a:t>1/29/2018</a:t>
+              <a:t>9/17/2018</a:t>
             </a:fld>
             <a:endParaRPr lang="en-US"/>
           </a:p>
@@ -3862,7 +3858,7 @@
           <a:p>
             <a:fld id="{6471BAD1-2447-4D0B-B8FB-103A4F807A4C}" type="datetimeFigureOut">
               <a:rPr lang="en-US" smtClean="0"/>
-              <a:t>1/29/2018</a:t>
+              <a:t>9/17/2018</a:t>
             </a:fld>
             <a:endParaRPr lang="en-US"/>
           </a:p>
@@ -3980,7 +3976,7 @@
           <a:p>
             <a:fld id="{6471BAD1-2447-4D0B-B8FB-103A4F807A4C}" type="datetimeFigureOut">
               <a:rPr lang="en-US" smtClean="0"/>
-              <a:t>1/29/2018</a:t>
+              <a:t>9/17/2018</a:t>
             </a:fld>
             <a:endParaRPr lang="en-US"/>
           </a:p>
@@ -4075,7 +4071,7 @@
           <a:p>
             <a:fld id="{6471BAD1-2447-4D0B-B8FB-103A4F807A4C}" type="datetimeFigureOut">
               <a:rPr lang="en-US" smtClean="0"/>
-              <a:t>1/29/2018</a:t>
+              <a:t>9/17/2018</a:t>
             </a:fld>
             <a:endParaRPr lang="en-US"/>
           </a:p>
@@ -4352,7 +4348,7 @@
           <a:p>
             <a:fld id="{6471BAD1-2447-4D0B-B8FB-103A4F807A4C}" type="datetimeFigureOut">
               <a:rPr lang="en-US" smtClean="0"/>
-              <a:t>1/29/2018</a:t>
+              <a:t>9/17/2018</a:t>
             </a:fld>
             <a:endParaRPr lang="en-US"/>
           </a:p>
@@ -4609,7 +4605,7 @@
           <a:p>
             <a:fld id="{6471BAD1-2447-4D0B-B8FB-103A4F807A4C}" type="datetimeFigureOut">
               <a:rPr lang="en-US" smtClean="0"/>
-              <a:t>1/29/2018</a:t>
+              <a:t>9/17/2018</a:t>
             </a:fld>
             <a:endParaRPr lang="en-US"/>
           </a:p>
@@ -4822,7 +4818,7 @@
           <a:p>
             <a:fld id="{6471BAD1-2447-4D0B-B8FB-103A4F807A4C}" type="datetimeFigureOut">
               <a:rPr lang="en-US" smtClean="0"/>
-              <a:t>1/29/2018</a:t>
+              <a:t>9/17/2018</a:t>
             </a:fld>
             <a:endParaRPr lang="en-US"/>
           </a:p>
@@ -5896,13 +5892,7 @@
             </a:r>
             <a:r>
               <a:rPr lang="en-US"/>
-              <a:t> – Pop-up with information, pause code. </a:t>
-            </a:r>
-            <a:r>
-              <a:rPr lang="en-US">
-                <a:sym typeface="Wingdings" panose="05000000000000000000" pitchFamily="2" charset="2"/>
-              </a:rPr>
-              <a:t></a:t>
+              <a:t> – Pop-up with information, pause code</a:t>
             </a:r>
             <a:endParaRPr lang="en-US" b="1"/>
           </a:p>

</xml_diff>